<commit_message>
Post session updates to Part 3.
</commit_message>
<xml_diff>
--- a/presentations/2024-04 Webinars/FHIR-Terminology-Part-3-2024-04-25.pptx
+++ b/presentations/2024-04 Webinars/FHIR-Terminology-Part-3-2024-04-25.pptx
@@ -20,8 +20,8 @@
     <p:sldId id="643" r:id="rId8"/>
     <p:sldId id="617" r:id="rId9"/>
     <p:sldId id="691" r:id="rId10"/>
-    <p:sldId id="698" r:id="rId11"/>
-    <p:sldId id="692" r:id="rId12"/>
+    <p:sldId id="692" r:id="rId11"/>
+    <p:sldId id="698" r:id="rId12"/>
     <p:sldId id="694" r:id="rId13"/>
     <p:sldId id="696" r:id="rId14"/>
     <p:sldId id="699" r:id="rId15"/>
@@ -9501,7 +9501,7 @@
           <p:cNvPr id="2" name="Title 1">
             <a:extLst>
               <a:ext uri="{FF2B5EF4-FFF2-40B4-BE49-F238E27FC236}">
-                <a16:creationId xmlns:a16="http://schemas.microsoft.com/office/drawing/2014/main" id="{21747FB9-EA58-1CAA-304F-6327EA08C691}"/>
+                <a16:creationId xmlns:a16="http://schemas.microsoft.com/office/drawing/2014/main" id="{052B3018-74D0-76D1-FDF1-29342D2C1FCE}"/>
               </a:ext>
             </a:extLst>
           </p:cNvPr>
@@ -9519,7 +9519,7 @@
           <a:p>
             <a:r>
               <a:rPr lang="en-US" dirty="0"/>
-              <a:t>Alternate terminology servers for FHIR IGs</a:t>
+              <a:t>Your Suggested Topics (cont.)</a:t>
             </a:r>
           </a:p>
         </p:txBody>
@@ -9529,7 +9529,7 @@
           <p:cNvPr id="3" name="Text Placeholder 2">
             <a:extLst>
               <a:ext uri="{FF2B5EF4-FFF2-40B4-BE49-F238E27FC236}">
-                <a16:creationId xmlns:a16="http://schemas.microsoft.com/office/drawing/2014/main" id="{DBE7B1D5-1280-42C6-0B48-8F1F819C144E}"/>
+                <a16:creationId xmlns:a16="http://schemas.microsoft.com/office/drawing/2014/main" id="{D8C0A368-1754-22A3-9471-681CD1CEB7DF}"/>
               </a:ext>
             </a:extLst>
           </p:cNvPr>
@@ -9546,30 +9546,44 @@
           <a:lstStyle/>
           <a:p>
             <a:r>
-              <a:rPr lang="en-US" dirty="0">
-                <a:hlinkClick r:id="rId2"/>
-              </a:rPr>
-              <a:t>Terminology Server Registry Documentation</a:t>
-            </a:r>
-            <a:endParaRPr lang="en-US" dirty="0"/>
-          </a:p>
-          <a:p>
-            <a:r>
-              <a:rPr lang="en-US" dirty="0">
-                <a:hlinkClick r:id="rId3"/>
-              </a:rPr>
-              <a:t>Running your own copy of tx.fhir.org</a:t>
-            </a:r>
-            <a:endParaRPr lang="en-US" dirty="0"/>
-          </a:p>
-          <a:p>
-            <a:r>
-              <a:rPr lang="en-US" dirty="0">
-                <a:hlinkClick r:id="rId4"/>
-              </a:rPr>
-              <a:t>Publishing terminology to the FHIR Ecosystem</a:t>
-            </a:r>
-            <a:endParaRPr lang="en-US" dirty="0"/>
+              <a:rPr lang="en-US" dirty="0"/>
+              <a:t>Terminology considerations in FHIR validation</a:t>
+            </a:r>
+          </a:p>
+          <a:p>
+            <a:pPr lvl="1"/>
+            <a:r>
+              <a:rPr lang="en-US" dirty="0"/>
+              <a:t>How to provide options?</a:t>
+            </a:r>
+          </a:p>
+          <a:p>
+            <a:pPr lvl="1"/>
+            <a:r>
+              <a:rPr lang="en-US" dirty="0"/>
+              <a:t>Validate all coded data instances (or not)?</a:t>
+            </a:r>
+          </a:p>
+          <a:p>
+            <a:pPr lvl="2"/>
+            <a:r>
+              <a:rPr lang="en-US" dirty="0"/>
+              <a:t>What about historic data?	</a:t>
+            </a:r>
+          </a:p>
+          <a:p>
+            <a:pPr lvl="1"/>
+            <a:r>
+              <a:rPr lang="en-US" dirty="0"/>
+              <a:t>How to handle terminology licensing (e.g. SNOMED CT, CPT)</a:t>
+            </a:r>
+          </a:p>
+          <a:p>
+            <a:pPr lvl="1"/>
+            <a:r>
+              <a:rPr lang="en-US" dirty="0"/>
+              <a:t>Regulatory compliance considerations (e.g. HTI-1)</a:t>
+            </a:r>
           </a:p>
         </p:txBody>
       </p:sp>
@@ -9578,7 +9592,7 @@
           <p:cNvPr id="4" name="Footer Placeholder 3">
             <a:extLst>
               <a:ext uri="{FF2B5EF4-FFF2-40B4-BE49-F238E27FC236}">
-                <a16:creationId xmlns:a16="http://schemas.microsoft.com/office/drawing/2014/main" id="{8A25C0E9-B4E1-082E-C0A4-3F96F8AC86E3}"/>
+                <a16:creationId xmlns:a16="http://schemas.microsoft.com/office/drawing/2014/main" id="{AFBCF623-B9C2-CA3F-715B-5518A491BF65}"/>
               </a:ext>
             </a:extLst>
           </p:cNvPr>
@@ -9613,7 +9627,7 @@
           <p:cNvPr id="5" name="Slide Number Placeholder 4">
             <a:extLst>
               <a:ext uri="{FF2B5EF4-FFF2-40B4-BE49-F238E27FC236}">
-                <a16:creationId xmlns:a16="http://schemas.microsoft.com/office/drawing/2014/main" id="{AC3FDEC6-8C7D-6E36-552E-B0A79CB7EC3A}"/>
+                <a16:creationId xmlns:a16="http://schemas.microsoft.com/office/drawing/2014/main" id="{24AE16FA-5F02-C775-0CC5-09E998368F57}"/>
               </a:ext>
             </a:extLst>
           </p:cNvPr>
@@ -9641,7 +9655,7 @@
     </p:spTree>
     <p:extLst>
       <p:ext uri="{BB962C8B-B14F-4D97-AF65-F5344CB8AC3E}">
-        <p14:creationId xmlns:p14="http://schemas.microsoft.com/office/powerpoint/2010/main" val="1308566650"/>
+        <p14:creationId xmlns:p14="http://schemas.microsoft.com/office/powerpoint/2010/main" val="1793938139"/>
       </p:ext>
     </p:extLst>
   </p:cSld>
@@ -9673,7 +9687,7 @@
           <p:cNvPr id="2" name="Title 1">
             <a:extLst>
               <a:ext uri="{FF2B5EF4-FFF2-40B4-BE49-F238E27FC236}">
-                <a16:creationId xmlns:a16="http://schemas.microsoft.com/office/drawing/2014/main" id="{052B3018-74D0-76D1-FDF1-29342D2C1FCE}"/>
+                <a16:creationId xmlns:a16="http://schemas.microsoft.com/office/drawing/2014/main" id="{21747FB9-EA58-1CAA-304F-6327EA08C691}"/>
               </a:ext>
             </a:extLst>
           </p:cNvPr>
@@ -9691,7 +9705,7 @@
           <a:p>
             <a:r>
               <a:rPr lang="en-US" dirty="0"/>
-              <a:t>Your Suggested Topics (cont.)</a:t>
+              <a:t>Alternate terminology servers for FHIR IGs</a:t>
             </a:r>
           </a:p>
         </p:txBody>
@@ -9701,7 +9715,7 @@
           <p:cNvPr id="3" name="Text Placeholder 2">
             <a:extLst>
               <a:ext uri="{FF2B5EF4-FFF2-40B4-BE49-F238E27FC236}">
-                <a16:creationId xmlns:a16="http://schemas.microsoft.com/office/drawing/2014/main" id="{D8C0A368-1754-22A3-9471-681CD1CEB7DF}"/>
+                <a16:creationId xmlns:a16="http://schemas.microsoft.com/office/drawing/2014/main" id="{DBE7B1D5-1280-42C6-0B48-8F1F819C144E}"/>
               </a:ext>
             </a:extLst>
           </p:cNvPr>
@@ -9718,44 +9732,30 @@
           <a:lstStyle/>
           <a:p>
             <a:r>
-              <a:rPr lang="en-US" dirty="0"/>
-              <a:t>Terminology considerations in FHIR validation</a:t>
-            </a:r>
-          </a:p>
-          <a:p>
-            <a:pPr lvl="1"/>
-            <a:r>
-              <a:rPr lang="en-US" dirty="0"/>
-              <a:t>How to provide options?</a:t>
-            </a:r>
-          </a:p>
-          <a:p>
-            <a:pPr lvl="1"/>
-            <a:r>
-              <a:rPr lang="en-US" dirty="0"/>
-              <a:t>Validate all coded data instances (or not)?</a:t>
-            </a:r>
-          </a:p>
-          <a:p>
-            <a:pPr lvl="2"/>
-            <a:r>
-              <a:rPr lang="en-US" dirty="0"/>
-              <a:t>What about historic data?	</a:t>
-            </a:r>
-          </a:p>
-          <a:p>
-            <a:pPr lvl="1"/>
-            <a:r>
-              <a:rPr lang="en-US" dirty="0"/>
-              <a:t>How to handle terminology licensing (e.g. SNOMED CT, CPT)</a:t>
-            </a:r>
-          </a:p>
-          <a:p>
-            <a:pPr lvl="1"/>
-            <a:r>
-              <a:rPr lang="en-US" dirty="0"/>
-              <a:t>Regulatory compliance considerations (e.g. HTI-1)</a:t>
-            </a:r>
+              <a:rPr lang="en-US" dirty="0">
+                <a:hlinkClick r:id="rId2"/>
+              </a:rPr>
+              <a:t>Terminology Server Registry Documentation</a:t>
+            </a:r>
+            <a:endParaRPr lang="en-US" dirty="0"/>
+          </a:p>
+          <a:p>
+            <a:r>
+              <a:rPr lang="en-US" dirty="0">
+                <a:hlinkClick r:id="rId3"/>
+              </a:rPr>
+              <a:t>Running your own copy of tx.fhir.org</a:t>
+            </a:r>
+            <a:endParaRPr lang="en-US" dirty="0"/>
+          </a:p>
+          <a:p>
+            <a:r>
+              <a:rPr lang="en-US" dirty="0">
+                <a:hlinkClick r:id="rId4"/>
+              </a:rPr>
+              <a:t>Publishing terminology to the FHIR Ecosystem</a:t>
+            </a:r>
+            <a:endParaRPr lang="en-US" dirty="0"/>
           </a:p>
         </p:txBody>
       </p:sp>
@@ -9764,7 +9764,7 @@
           <p:cNvPr id="4" name="Footer Placeholder 3">
             <a:extLst>
               <a:ext uri="{FF2B5EF4-FFF2-40B4-BE49-F238E27FC236}">
-                <a16:creationId xmlns:a16="http://schemas.microsoft.com/office/drawing/2014/main" id="{AFBCF623-B9C2-CA3F-715B-5518A491BF65}"/>
+                <a16:creationId xmlns:a16="http://schemas.microsoft.com/office/drawing/2014/main" id="{8A25C0E9-B4E1-082E-C0A4-3F96F8AC86E3}"/>
               </a:ext>
             </a:extLst>
           </p:cNvPr>
@@ -9799,7 +9799,7 @@
           <p:cNvPr id="5" name="Slide Number Placeholder 4">
             <a:extLst>
               <a:ext uri="{FF2B5EF4-FFF2-40B4-BE49-F238E27FC236}">
-                <a16:creationId xmlns:a16="http://schemas.microsoft.com/office/drawing/2014/main" id="{24AE16FA-5F02-C775-0CC5-09E998368F57}"/>
+                <a16:creationId xmlns:a16="http://schemas.microsoft.com/office/drawing/2014/main" id="{AC3FDEC6-8C7D-6E36-552E-B0A79CB7EC3A}"/>
               </a:ext>
             </a:extLst>
           </p:cNvPr>
@@ -9827,7 +9827,7 @@
     </p:spTree>
     <p:extLst>
       <p:ext uri="{BB962C8B-B14F-4D97-AF65-F5344CB8AC3E}">
-        <p14:creationId xmlns:p14="http://schemas.microsoft.com/office/powerpoint/2010/main" val="1793938139"/>
+        <p14:creationId xmlns:p14="http://schemas.microsoft.com/office/powerpoint/2010/main" val="1308566650"/>
       </p:ext>
     </p:extLst>
   </p:cSld>
@@ -10155,7 +10155,7 @@
           <a:p>
             <a:r>
               <a:rPr lang="en-US" dirty="0"/>
-              <a:t>SNOMED CT Description IDs</a:t>
+              <a:t>Representing hierarchy in FHIR</a:t>
             </a:r>
           </a:p>
           <a:p>
@@ -10475,7 +10475,7 @@
           <a:p>
             <a:r>
               <a:rPr lang="en-US" dirty="0"/>
-              <a:t>SNOMED CT Description IDs</a:t>
+              <a:t>Custom code systems and value sets</a:t>
             </a:r>
           </a:p>
           <a:p>
@@ -13127,7 +13127,15 @@
             </a:r>
             <a:r>
               <a:rPr lang="en-US" dirty="0"/>
-              <a:t>Objectives</a:t>
+              <a:t>Objectives </a:t>
+            </a:r>
+            <a:r>
+              <a:rPr lang="en-US" dirty="0">
+                <a:solidFill>
+                  <a:srgbClr val="00B050"/>
+                </a:solidFill>
+              </a:rPr>
+              <a:t>(covered)</a:t>
             </a:r>
             <a:endParaRPr lang="en-US" noProof="0" dirty="0"/>
           </a:p>

</xml_diff>